<commit_message>
Finitshed initial draft of the ideal team
</commit_message>
<xml_diff>
--- a/Presentation.pptx
+++ b/Presentation.pptx
@@ -30,6 +30,8 @@
     <p:sldId id="277" r:id="rId24"/>
     <p:sldId id="278" r:id="rId25"/>
     <p:sldId id="279" r:id="rId26"/>
+    <p:sldId id="281" r:id="rId27"/>
+    <p:sldId id="282" r:id="rId28"/>
   </p:sldIdLst>
   <p:sldSz cx="12192000" cy="6858000"/>
   <p:notesSz cx="6858000" cy="9144000"/>
@@ -7613,12 +7615,18 @@
             </a:r>
           </a:p>
           <a:p>
+            <a:endParaRPr lang="en-US" dirty="0"/>
+          </a:p>
+          <a:p>
             <a:r>
               <a:rPr lang="en-US" dirty="0"/>
               <a:t>One often takes a leadership role, despite a strong partnership</a:t>
             </a:r>
           </a:p>
           <a:p>
+            <a:endParaRPr lang="en-US" dirty="0"/>
+          </a:p>
+          <a:p>
             <a:r>
               <a:rPr lang="en-US" dirty="0"/>
               <a:t>Can be hard to work with someone else</a:t>
@@ -7627,10 +7635,9 @@
           <a:p>
             <a:pPr lvl="1"/>
             <a:r>
-              <a:rPr lang="en-US"/>
+              <a:rPr lang="en-US" dirty="0"/>
               <a:t>Ex: Robin (Dick Grayson to Jason Todd)</a:t>
             </a:r>
-            <a:endParaRPr lang="en-US" dirty="0"/>
           </a:p>
           <a:p>
             <a:endParaRPr lang="en-US" dirty="0"/>
@@ -7892,7 +7899,7 @@
           <a:p>
             <a:r>
               <a:rPr lang="en-US" dirty="0"/>
-              <a:t>The “Ideal” Team</a:t>
+              <a:t>What do we need for an ideal team?</a:t>
             </a:r>
           </a:p>
         </p:txBody>
@@ -7915,25 +7922,52 @@
         </p:nvSpPr>
         <p:spPr/>
         <p:txBody>
-          <a:bodyPr/>
+          <a:bodyPr>
+            <a:normAutofit/>
+          </a:bodyPr>
           <a:lstStyle/>
           <a:p>
             <a:r>
               <a:rPr lang="en-US" dirty="0"/>
-              <a:t>Team comes together to solve problems</a:t>
-            </a:r>
-          </a:p>
-          <a:p>
-            <a:r>
-              <a:rPr lang="en-US" dirty="0"/>
-              <a:t>Leaders can rotate since team has a common goal</a:t>
-            </a:r>
-          </a:p>
-          <a:p>
-            <a:r>
-              <a:rPr lang="en-US" dirty="0"/>
-              <a:t>Junior members are rai</a:t>
-            </a:r>
+              <a:t>Team come together when a specific problem needs to be solved</a:t>
+            </a:r>
+          </a:p>
+          <a:p>
+            <a:r>
+              <a:rPr lang="en-US" dirty="0"/>
+              <a:t>Leader pushes project quality ownership</a:t>
+            </a:r>
+          </a:p>
+          <a:p>
+            <a:r>
+              <a:rPr lang="en-US" dirty="0"/>
+              <a:t>A balance of the qualities previously discussed</a:t>
+            </a:r>
+          </a:p>
+          <a:p>
+            <a:r>
+              <a:rPr lang="en-US" dirty="0"/>
+              <a:t>Mentorship so that everyone is growing</a:t>
+            </a:r>
+          </a:p>
+          <a:p>
+            <a:pPr lvl="1"/>
+            <a:r>
+              <a:rPr lang="en-US" dirty="0"/>
+              <a:t>Junior members become senior</a:t>
+            </a:r>
+          </a:p>
+          <a:p>
+            <a:pPr lvl="1"/>
+            <a:r>
+              <a:rPr lang="en-US" dirty="0"/>
+              <a:t>Senior take on more leadership of their </a:t>
+            </a:r>
+            <a:r>
+              <a:rPr lang="en-US"/>
+              <a:t>focus are</a:t>
+            </a:r>
+            <a:endParaRPr lang="en-US" dirty="0"/>
           </a:p>
         </p:txBody>
       </p:sp>
@@ -7941,6 +7975,278 @@
     <p:extLst>
       <p:ext uri="{BB962C8B-B14F-4D97-AF65-F5344CB8AC3E}">
         <p14:creationId xmlns:p14="http://schemas.microsoft.com/office/powerpoint/2010/main" val="2656446168"/>
+      </p:ext>
+    </p:extLst>
+  </p:cSld>
+  <p:clrMapOvr>
+    <a:masterClrMapping/>
+  </p:clrMapOvr>
+</p:sld>
+</file>
+
+<file path=ppt/slides/slide26.xml><?xml version="1.0" encoding="utf-8"?>
+<p:sld xmlns:a="http://schemas.openxmlformats.org/drawingml/2006/main" xmlns:r="http://schemas.openxmlformats.org/officeDocument/2006/relationships" xmlns:p="http://schemas.openxmlformats.org/presentationml/2006/main">
+  <p:cSld>
+    <p:spTree>
+      <p:nvGrpSpPr>
+        <p:cNvPr id="1" name=""/>
+        <p:cNvGrpSpPr/>
+        <p:nvPr/>
+      </p:nvGrpSpPr>
+      <p:grpSpPr>
+        <a:xfrm>
+          <a:off x="0" y="0"/>
+          <a:ext cx="0" cy="0"/>
+          <a:chOff x="0" y="0"/>
+          <a:chExt cx="0" cy="0"/>
+        </a:xfrm>
+      </p:grpSpPr>
+      <p:sp>
+        <p:nvSpPr>
+          <p:cNvPr id="2" name="Title 1">
+            <a:extLst>
+              <a:ext uri="{FF2B5EF4-FFF2-40B4-BE49-F238E27FC236}">
+                <a16:creationId xmlns:a16="http://schemas.microsoft.com/office/drawing/2014/main" id="{D2115702-96A2-BC4A-9F50-FC9CDD805AB1}"/>
+              </a:ext>
+            </a:extLst>
+          </p:cNvPr>
+          <p:cNvSpPr>
+            <a:spLocks noGrp="1"/>
+          </p:cNvSpPr>
+          <p:nvPr>
+            <p:ph type="title"/>
+          </p:nvPr>
+        </p:nvSpPr>
+        <p:spPr/>
+        <p:txBody>
+          <a:bodyPr/>
+          <a:lstStyle/>
+          <a:p>
+            <a:r>
+              <a:rPr lang="en-US" dirty="0"/>
+              <a:t>The Avengers</a:t>
+            </a:r>
+          </a:p>
+        </p:txBody>
+      </p:sp>
+      <p:sp>
+        <p:nvSpPr>
+          <p:cNvPr id="3" name="Content Placeholder 2">
+            <a:extLst>
+              <a:ext uri="{FF2B5EF4-FFF2-40B4-BE49-F238E27FC236}">
+                <a16:creationId xmlns:a16="http://schemas.microsoft.com/office/drawing/2014/main" id="{B7488EAA-081F-4940-80C7-E837AF79A96D}"/>
+              </a:ext>
+            </a:extLst>
+          </p:cNvPr>
+          <p:cNvSpPr>
+            <a:spLocks noGrp="1"/>
+          </p:cNvSpPr>
+          <p:nvPr>
+            <p:ph idx="1"/>
+          </p:nvPr>
+        </p:nvSpPr>
+        <p:spPr/>
+        <p:txBody>
+          <a:bodyPr>
+            <a:normAutofit fontScale="92500"/>
+          </a:bodyPr>
+          <a:lstStyle/>
+          <a:p>
+            <a:r>
+              <a:rPr lang="en-US" dirty="0"/>
+              <a:t>Multiple teams that work together</a:t>
+            </a:r>
+          </a:p>
+          <a:p>
+            <a:pPr lvl="1"/>
+            <a:r>
+              <a:rPr lang="en-US" dirty="0"/>
+              <a:t>Ex: Avengers: Infinity War</a:t>
+            </a:r>
+          </a:p>
+          <a:p>
+            <a:pPr lvl="1"/>
+            <a:r>
+              <a:rPr lang="en-US" dirty="0"/>
+              <a:t>More common in the comics</a:t>
+            </a:r>
+          </a:p>
+          <a:p>
+            <a:r>
+              <a:rPr lang="en-US" dirty="0"/>
+              <a:t>Diverse backgrounds</a:t>
+            </a:r>
+          </a:p>
+          <a:p>
+            <a:pPr lvl="1"/>
+            <a:r>
+              <a:rPr lang="en-US" dirty="0"/>
+              <a:t>Ex: Uncanny Avengers</a:t>
+            </a:r>
+          </a:p>
+          <a:p>
+            <a:r>
+              <a:rPr lang="en-US" dirty="0"/>
+              <a:t>Team focus may vary, but is known by all members</a:t>
+            </a:r>
+          </a:p>
+          <a:p>
+            <a:pPr lvl="1"/>
+            <a:r>
+              <a:rPr lang="en-US" dirty="0"/>
+              <a:t>Ex: Avengers on Titan to stop </a:t>
+            </a:r>
+            <a:r>
+              <a:rPr lang="en-US" dirty="0" err="1"/>
+              <a:t>Thanos</a:t>
+            </a:r>
+            <a:r>
+              <a:rPr lang="en-US" dirty="0"/>
+              <a:t>; Avengers on Earth to protect Vision</a:t>
+            </a:r>
+          </a:p>
+          <a:p>
+            <a:pPr lvl="1"/>
+            <a:r>
+              <a:rPr lang="en-US" dirty="0"/>
+              <a:t>Ex: Mighty Avengers take on low-level criminals, Uncanny Avengers work to improve Human/Mutant Relations</a:t>
+            </a:r>
+          </a:p>
+        </p:txBody>
+      </p:sp>
+    </p:spTree>
+    <p:extLst>
+      <p:ext uri="{BB962C8B-B14F-4D97-AF65-F5344CB8AC3E}">
+        <p14:creationId xmlns:p14="http://schemas.microsoft.com/office/powerpoint/2010/main" val="2242025629"/>
+      </p:ext>
+    </p:extLst>
+  </p:cSld>
+  <p:clrMapOvr>
+    <a:masterClrMapping/>
+  </p:clrMapOvr>
+</p:sld>
+</file>
+
+<file path=ppt/slides/slide27.xml><?xml version="1.0" encoding="utf-8"?>
+<p:sld xmlns:a="http://schemas.openxmlformats.org/drawingml/2006/main" xmlns:r="http://schemas.openxmlformats.org/officeDocument/2006/relationships" xmlns:p="http://schemas.openxmlformats.org/presentationml/2006/main">
+  <p:cSld>
+    <p:spTree>
+      <p:nvGrpSpPr>
+        <p:cNvPr id="1" name=""/>
+        <p:cNvGrpSpPr/>
+        <p:nvPr/>
+      </p:nvGrpSpPr>
+      <p:grpSpPr>
+        <a:xfrm>
+          <a:off x="0" y="0"/>
+          <a:ext cx="0" cy="0"/>
+          <a:chOff x="0" y="0"/>
+          <a:chExt cx="0" cy="0"/>
+        </a:xfrm>
+      </p:grpSpPr>
+      <p:sp>
+        <p:nvSpPr>
+          <p:cNvPr id="2" name="Title 1">
+            <a:extLst>
+              <a:ext uri="{FF2B5EF4-FFF2-40B4-BE49-F238E27FC236}">
+                <a16:creationId xmlns:a16="http://schemas.microsoft.com/office/drawing/2014/main" id="{E0DAA0FD-DB43-6E4E-89A9-A42EC9E19622}"/>
+              </a:ext>
+            </a:extLst>
+          </p:cNvPr>
+          <p:cNvSpPr>
+            <a:spLocks noGrp="1"/>
+          </p:cNvSpPr>
+          <p:nvPr>
+            <p:ph type="title"/>
+          </p:nvPr>
+        </p:nvSpPr>
+        <p:spPr/>
+        <p:txBody>
+          <a:bodyPr/>
+          <a:lstStyle/>
+          <a:p>
+            <a:r>
+              <a:rPr lang="en-US" dirty="0"/>
+              <a:t>How can you reach me for questions?</a:t>
+            </a:r>
+          </a:p>
+        </p:txBody>
+      </p:sp>
+      <p:sp>
+        <p:nvSpPr>
+          <p:cNvPr id="3" name="Content Placeholder 2">
+            <a:extLst>
+              <a:ext uri="{FF2B5EF4-FFF2-40B4-BE49-F238E27FC236}">
+                <a16:creationId xmlns:a16="http://schemas.microsoft.com/office/drawing/2014/main" id="{25E38E1E-9B52-F74E-B41B-C5A47FE57D79}"/>
+              </a:ext>
+            </a:extLst>
+          </p:cNvPr>
+          <p:cNvSpPr>
+            <a:spLocks noGrp="1"/>
+          </p:cNvSpPr>
+          <p:nvPr>
+            <p:ph idx="1"/>
+          </p:nvPr>
+        </p:nvSpPr>
+        <p:spPr/>
+        <p:txBody>
+          <a:bodyPr/>
+          <a:lstStyle/>
+          <a:p>
+            <a:r>
+              <a:rPr lang="en-US" dirty="0">
+                <a:hlinkClick r:id="rId2"/>
+              </a:rPr>
+              <a:t>LinkedIn (linkedin.com/in/aaron-deming/)</a:t>
+            </a:r>
+            <a:endParaRPr lang="en-US" dirty="0"/>
+          </a:p>
+          <a:p>
+            <a:r>
+              <a:rPr lang="en-US" dirty="0">
+                <a:hlinkClick r:id="rId3"/>
+              </a:rPr>
+              <a:t>Twitter (@aaron_deming)</a:t>
+            </a:r>
+            <a:endParaRPr lang="en-US" dirty="0"/>
+          </a:p>
+          <a:p>
+            <a:endParaRPr lang="en-US" dirty="0"/>
+          </a:p>
+          <a:p>
+            <a:endParaRPr lang="en-US" dirty="0"/>
+          </a:p>
+          <a:p>
+            <a:endParaRPr lang="en-US" dirty="0"/>
+          </a:p>
+          <a:p>
+            <a:endParaRPr lang="en-US" dirty="0"/>
+          </a:p>
+          <a:p>
+            <a:r>
+              <a:rPr lang="en-US" dirty="0"/>
+              <a:t>Check out </a:t>
+            </a:r>
+            <a:r>
+              <a:rPr lang="en-US" dirty="0" err="1"/>
+              <a:t>buildertrend.com</a:t>
+            </a:r>
+            <a:r>
+              <a:rPr lang="en-US" dirty="0"/>
+              <a:t> to learn more about </a:t>
+            </a:r>
+            <a:r>
+              <a:rPr lang="en-US" dirty="0" err="1"/>
+              <a:t>Buildertrend</a:t>
+            </a:r>
+            <a:endParaRPr lang="en-US" dirty="0"/>
+          </a:p>
+        </p:txBody>
+      </p:sp>
+    </p:spTree>
+    <p:extLst>
+      <p:ext uri="{BB962C8B-B14F-4D97-AF65-F5344CB8AC3E}">
+        <p14:creationId xmlns:p14="http://schemas.microsoft.com/office/powerpoint/2010/main" val="630320254"/>
       </p:ext>
     </p:extLst>
   </p:cSld>

</xml_diff>

<commit_message>
Adding incomplete conclusion slide.
</commit_message>
<xml_diff>
--- a/Presentation.pptx
+++ b/Presentation.pptx
@@ -31,7 +31,8 @@
     <p:sldId id="278" r:id="rId25"/>
     <p:sldId id="279" r:id="rId26"/>
     <p:sldId id="281" r:id="rId27"/>
-    <p:sldId id="282" r:id="rId28"/>
+    <p:sldId id="283" r:id="rId28"/>
+    <p:sldId id="282" r:id="rId29"/>
   </p:sldIdLst>
   <p:sldSz cx="12192000" cy="6858000"/>
   <p:notesSz cx="6858000" cy="9144000"/>
@@ -6050,7 +6051,7 @@
             <a:pPr lvl="1"/>
             <a:r>
               <a:rPr lang="en-US" dirty="0"/>
-              <a:t>Why Superman sucks</a:t>
+              <a:t>Why Superman is subpar</a:t>
             </a:r>
           </a:p>
           <a:p>
@@ -7961,13 +7962,8 @@
             <a:pPr lvl="1"/>
             <a:r>
               <a:rPr lang="en-US" dirty="0"/>
-              <a:t>Senior take on more leadership of their </a:t>
-            </a:r>
-            <a:r>
-              <a:rPr lang="en-US"/>
-              <a:t>focus are</a:t>
-            </a:r>
-            <a:endParaRPr lang="en-US" dirty="0"/>
+              <a:t>Senior take on more leadership of their focus are</a:t>
+            </a:r>
           </a:p>
         </p:txBody>
       </p:sp>
@@ -8149,6 +8145,105 @@
           <p:cNvPr id="2" name="Title 1">
             <a:extLst>
               <a:ext uri="{FF2B5EF4-FFF2-40B4-BE49-F238E27FC236}">
+                <a16:creationId xmlns:a16="http://schemas.microsoft.com/office/drawing/2014/main" id="{4755ADE9-23C1-A046-AE96-56A0331DC537}"/>
+              </a:ext>
+            </a:extLst>
+          </p:cNvPr>
+          <p:cNvSpPr>
+            <a:spLocks noGrp="1"/>
+          </p:cNvSpPr>
+          <p:nvPr>
+            <p:ph type="title"/>
+          </p:nvPr>
+        </p:nvSpPr>
+        <p:spPr/>
+        <p:txBody>
+          <a:bodyPr/>
+          <a:lstStyle/>
+          <a:p>
+            <a:r>
+              <a:rPr lang="en-US" dirty="0"/>
+              <a:t>Conclusion</a:t>
+            </a:r>
+          </a:p>
+        </p:txBody>
+      </p:sp>
+      <p:sp>
+        <p:nvSpPr>
+          <p:cNvPr id="3" name="Content Placeholder 2">
+            <a:extLst>
+              <a:ext uri="{FF2B5EF4-FFF2-40B4-BE49-F238E27FC236}">
+                <a16:creationId xmlns:a16="http://schemas.microsoft.com/office/drawing/2014/main" id="{54CC754A-1868-994E-A50A-2AFF43C2AC6B}"/>
+              </a:ext>
+            </a:extLst>
+          </p:cNvPr>
+          <p:cNvSpPr>
+            <a:spLocks noGrp="1"/>
+          </p:cNvSpPr>
+          <p:nvPr>
+            <p:ph idx="1"/>
+          </p:nvPr>
+        </p:nvSpPr>
+        <p:spPr/>
+        <p:txBody>
+          <a:bodyPr/>
+          <a:lstStyle/>
+          <a:p>
+            <a:r>
+              <a:rPr lang="en-US" dirty="0"/>
+              <a:t>Think about developer strengths and weaknesses</a:t>
+            </a:r>
+          </a:p>
+          <a:p>
+            <a:r>
+              <a:rPr lang="en-US" dirty="0"/>
+              <a:t>Group them together to solve the types </a:t>
+            </a:r>
+            <a:r>
+              <a:rPr lang="en-US"/>
+              <a:t>of problems they need</a:t>
+            </a:r>
+          </a:p>
+          <a:p>
+            <a:endParaRPr lang="en-US" dirty="0"/>
+          </a:p>
+        </p:txBody>
+      </p:sp>
+    </p:spTree>
+    <p:extLst>
+      <p:ext uri="{BB962C8B-B14F-4D97-AF65-F5344CB8AC3E}">
+        <p14:creationId xmlns:p14="http://schemas.microsoft.com/office/powerpoint/2010/main" val="2978323638"/>
+      </p:ext>
+    </p:extLst>
+  </p:cSld>
+  <p:clrMapOvr>
+    <a:masterClrMapping/>
+  </p:clrMapOvr>
+</p:sld>
+</file>
+
+<file path=ppt/slides/slide28.xml><?xml version="1.0" encoding="utf-8"?>
+<p:sld xmlns:a="http://schemas.openxmlformats.org/drawingml/2006/main" xmlns:r="http://schemas.openxmlformats.org/officeDocument/2006/relationships" xmlns:p="http://schemas.openxmlformats.org/presentationml/2006/main">
+  <p:cSld>
+    <p:spTree>
+      <p:nvGrpSpPr>
+        <p:cNvPr id="1" name=""/>
+        <p:cNvGrpSpPr/>
+        <p:nvPr/>
+      </p:nvGrpSpPr>
+      <p:grpSpPr>
+        <a:xfrm>
+          <a:off x="0" y="0"/>
+          <a:ext cx="0" cy="0"/>
+          <a:chOff x="0" y="0"/>
+          <a:chExt cx="0" cy="0"/>
+        </a:xfrm>
+      </p:grpSpPr>
+      <p:sp>
+        <p:nvSpPr>
+          <p:cNvPr id="2" name="Title 1">
+            <a:extLst>
+              <a:ext uri="{FF2B5EF4-FFF2-40B4-BE49-F238E27FC236}">
                 <a16:creationId xmlns:a16="http://schemas.microsoft.com/office/drawing/2014/main" id="{E0DAA0FD-DB43-6E4E-89A9-A42EC9E19622}"/>
               </a:ext>
             </a:extLst>
@@ -8342,7 +8437,7 @@
             </a:r>
             <a:r>
               <a:rPr lang="en-US" dirty="0" err="1"/>
-              <a:t>Coconstruct</a:t>
+              <a:t>CoConstruct</a:t>
             </a:r>
             <a:endParaRPr lang="en-US" dirty="0"/>
           </a:p>
@@ -8739,25 +8834,25 @@
           <a:p>
             <a:r>
               <a:rPr lang="en-US" dirty="0"/>
-              <a:t>2017: Team Lead of 1 of 5, 4-person teams</a:t>
-            </a:r>
-          </a:p>
-          <a:p>
-            <a:r>
-              <a:rPr lang="en-US" dirty="0"/>
-              <a:t>2018: Team Lead of 1 of 7, 8-person teams</a:t>
-            </a:r>
-          </a:p>
-          <a:p>
-            <a:r>
-              <a:rPr lang="en-US" dirty="0"/>
-              <a:t>2019: Trainer. Oversaw onboarding of ??? developers</a:t>
-            </a:r>
-          </a:p>
-          <a:p>
-            <a:r>
-              <a:rPr lang="en-US" dirty="0"/>
-              <a:t>2020: Trainer, overseeing dev team of all new developers</a:t>
+              <a:t>2017: Team Lead, oversaw 1 of 5 teams, 4-person teams</a:t>
+            </a:r>
+          </a:p>
+          <a:p>
+            <a:r>
+              <a:rPr lang="en-US" dirty="0"/>
+              <a:t>2018: Team Lead, oversaw 1 of 7 teams, 8-person teams</a:t>
+            </a:r>
+          </a:p>
+          <a:p>
+            <a:r>
+              <a:rPr lang="en-US" dirty="0"/>
+              <a:t>2019: Trainer, oversaw onboarding of ??? developers</a:t>
+            </a:r>
+          </a:p>
+          <a:p>
+            <a:r>
+              <a:rPr lang="en-US" dirty="0"/>
+              <a:t>2020: Trainer, oversaw dev team of all new developers</a:t>
             </a:r>
           </a:p>
           <a:p>

</xml_diff>